<commit_message>
modif ppt schema neuro
</commit_message>
<xml_diff>
--- a/documents/Brain présentation.pptx
+++ b/documents/Brain présentation.pptx
@@ -106,7 +106,361 @@
       </a:defRPr>
     </a:lvl9pPr>
   </p:defaultTextStyle>
+  <p:extLst>
+    <p:ext uri="{EFAFB233-063F-42B5-8137-9DF3F51BA10A}">
+      <p15:sldGuideLst xmlns:p15="http://schemas.microsoft.com/office/powerpoint/2012/main"/>
+    </p:ext>
+  </p:extLst>
 </p:presentation>
+</file>
+
+<file path=ppt/revisionInfo.xml><?xml version="1.0" encoding="utf-8"?>
+<p1510:revInfo xmlns:a="http://schemas.openxmlformats.org/drawingml/2006/main" xmlns:r="http://schemas.openxmlformats.org/officeDocument/2006/relationships" xmlns:p1510="http://schemas.microsoft.com/office/powerpoint/2015/10/main">
+  <p1510:revLst>
+    <p1510:client id="{A53F55EA-FBA8-4B3E-9B49-50BA8991E3F2}" v="17" dt="2020-03-26T10:09:33.592"/>
+  </p1510:revLst>
+</p1510:revInfo>
+</file>
+
+<file path=ppt/changesInfos/changesInfo1.xml><?xml version="1.0" encoding="utf-8"?>
+<pc:chgInfo xmlns:a="http://schemas.openxmlformats.org/drawingml/2006/main" xmlns:r="http://schemas.openxmlformats.org/officeDocument/2006/relationships" xmlns:ac="http://schemas.microsoft.com/office/drawing/2013/main/command" xmlns:pc="http://schemas.microsoft.com/office/powerpoint/2013/main/command">
+  <pc:docChgLst>
+    <pc:chgData name="Eric Harkat" userId="b3a6f5f8305364d9" providerId="LiveId" clId="{A53F55EA-FBA8-4B3E-9B49-50BA8991E3F2}"/>
+    <pc:docChg chg="undo custSel modSld">
+      <pc:chgData name="Eric Harkat" userId="b3a6f5f8305364d9" providerId="LiveId" clId="{A53F55EA-FBA8-4B3E-9B49-50BA8991E3F2}" dt="2020-03-26T10:10:48.017" v="214" actId="1076"/>
+      <pc:docMkLst>
+        <pc:docMk/>
+      </pc:docMkLst>
+      <pc:sldChg chg="addSp delSp modSp">
+        <pc:chgData name="Eric Harkat" userId="b3a6f5f8305364d9" providerId="LiveId" clId="{A53F55EA-FBA8-4B3E-9B49-50BA8991E3F2}" dt="2020-03-26T10:10:48.017" v="214" actId="1076"/>
+        <pc:sldMkLst>
+          <pc:docMk/>
+          <pc:sldMk cId="3025973111" sldId="258"/>
+        </pc:sldMkLst>
+        <pc:spChg chg="del mod">
+          <ac:chgData name="Eric Harkat" userId="b3a6f5f8305364d9" providerId="LiveId" clId="{A53F55EA-FBA8-4B3E-9B49-50BA8991E3F2}" dt="2020-03-26T10:05:39.703" v="127" actId="478"/>
+          <ac:spMkLst>
+            <pc:docMk/>
+            <pc:sldMk cId="3025973111" sldId="258"/>
+            <ac:spMk id="6" creationId="{6121C3E5-5922-4EB9-98F8-945E813F8831}"/>
+          </ac:spMkLst>
+        </pc:spChg>
+        <pc:spChg chg="mod">
+          <ac:chgData name="Eric Harkat" userId="b3a6f5f8305364d9" providerId="LiveId" clId="{A53F55EA-FBA8-4B3E-9B49-50BA8991E3F2}" dt="2020-03-26T10:07:05.475" v="142" actId="1076"/>
+          <ac:spMkLst>
+            <pc:docMk/>
+            <pc:sldMk cId="3025973111" sldId="258"/>
+            <ac:spMk id="12" creationId="{FB66BC86-0D2F-4F86-845E-5B9C59D75F79}"/>
+          </ac:spMkLst>
+        </pc:spChg>
+        <pc:spChg chg="mod">
+          <ac:chgData name="Eric Harkat" userId="b3a6f5f8305364d9" providerId="LiveId" clId="{A53F55EA-FBA8-4B3E-9B49-50BA8991E3F2}" dt="2020-03-26T10:07:25.179" v="147" actId="1076"/>
+          <ac:spMkLst>
+            <pc:docMk/>
+            <pc:sldMk cId="3025973111" sldId="258"/>
+            <ac:spMk id="13" creationId="{5FFCC645-905C-4323-B8EF-CF5B7C9152C2}"/>
+          </ac:spMkLst>
+        </pc:spChg>
+        <pc:spChg chg="mod">
+          <ac:chgData name="Eric Harkat" userId="b3a6f5f8305364d9" providerId="LiveId" clId="{A53F55EA-FBA8-4B3E-9B49-50BA8991E3F2}" dt="2020-03-26T10:08:06.175" v="156" actId="1076"/>
+          <ac:spMkLst>
+            <pc:docMk/>
+            <pc:sldMk cId="3025973111" sldId="258"/>
+            <ac:spMk id="17" creationId="{EAB9BA3C-3397-4E27-A32A-4549E8070CC4}"/>
+          </ac:spMkLst>
+        </pc:spChg>
+        <pc:spChg chg="mod">
+          <ac:chgData name="Eric Harkat" userId="b3a6f5f8305364d9" providerId="LiveId" clId="{A53F55EA-FBA8-4B3E-9B49-50BA8991E3F2}" dt="2020-03-26T10:08:08.815" v="157" actId="1076"/>
+          <ac:spMkLst>
+            <pc:docMk/>
+            <pc:sldMk cId="3025973111" sldId="258"/>
+            <ac:spMk id="18" creationId="{27B9D9C7-B7F5-460A-8854-AD29B732DA6B}"/>
+          </ac:spMkLst>
+        </pc:spChg>
+        <pc:spChg chg="mod">
+          <ac:chgData name="Eric Harkat" userId="b3a6f5f8305364d9" providerId="LiveId" clId="{A53F55EA-FBA8-4B3E-9B49-50BA8991E3F2}" dt="2020-03-26T09:54:52.544" v="3" actId="1076"/>
+          <ac:spMkLst>
+            <pc:docMk/>
+            <pc:sldMk cId="3025973111" sldId="258"/>
+            <ac:spMk id="19" creationId="{E93238BD-0B1D-4229-B1A2-2D12D3185951}"/>
+          </ac:spMkLst>
+        </pc:spChg>
+        <pc:spChg chg="del mod">
+          <ac:chgData name="Eric Harkat" userId="b3a6f5f8305364d9" providerId="LiveId" clId="{A53F55EA-FBA8-4B3E-9B49-50BA8991E3F2}" dt="2020-03-26T10:05:47.351" v="131" actId="478"/>
+          <ac:spMkLst>
+            <pc:docMk/>
+            <pc:sldMk cId="3025973111" sldId="258"/>
+            <ac:spMk id="24" creationId="{0033B484-A743-4154-86CA-4F7240CF00D9}"/>
+          </ac:spMkLst>
+        </pc:spChg>
+        <pc:spChg chg="add mod">
+          <ac:chgData name="Eric Harkat" userId="b3a6f5f8305364d9" providerId="LiveId" clId="{A53F55EA-FBA8-4B3E-9B49-50BA8991E3F2}" dt="2020-03-26T09:54:41.612" v="2" actId="1076"/>
+          <ac:spMkLst>
+            <pc:docMk/>
+            <pc:sldMk cId="3025973111" sldId="258"/>
+            <ac:spMk id="31" creationId="{90009500-BADC-4794-BEB6-543C81F9F8D6}"/>
+          </ac:spMkLst>
+        </pc:spChg>
+        <pc:spChg chg="add mod">
+          <ac:chgData name="Eric Harkat" userId="b3a6f5f8305364d9" providerId="LiveId" clId="{A53F55EA-FBA8-4B3E-9B49-50BA8991E3F2}" dt="2020-03-26T10:08:11.122" v="158" actId="1076"/>
+          <ac:spMkLst>
+            <pc:docMk/>
+            <pc:sldMk cId="3025973111" sldId="258"/>
+            <ac:spMk id="33" creationId="{18191BDD-E59B-4869-A146-CB692938E9B7}"/>
+          </ac:spMkLst>
+        </pc:spChg>
+        <pc:spChg chg="add mod">
+          <ac:chgData name="Eric Harkat" userId="b3a6f5f8305364d9" providerId="LiveId" clId="{A53F55EA-FBA8-4B3E-9B49-50BA8991E3F2}" dt="2020-03-26T10:08:16.873" v="159" actId="1076"/>
+          <ac:spMkLst>
+            <pc:docMk/>
+            <pc:sldMk cId="3025973111" sldId="258"/>
+            <ac:spMk id="35" creationId="{C4277E52-086C-43C6-BE30-351AB033B209}"/>
+          </ac:spMkLst>
+        </pc:spChg>
+        <pc:spChg chg="mod">
+          <ac:chgData name="Eric Harkat" userId="b3a6f5f8305364d9" providerId="LiveId" clId="{A53F55EA-FBA8-4B3E-9B49-50BA8991E3F2}" dt="2020-03-26T10:05:27.887" v="123" actId="20577"/>
+          <ac:spMkLst>
+            <pc:docMk/>
+            <pc:sldMk cId="3025973111" sldId="258"/>
+            <ac:spMk id="53" creationId="{DABD211E-7AC4-4BFA-ACD8-AFF80993E5ED}"/>
+          </ac:spMkLst>
+        </pc:spChg>
+        <pc:spChg chg="mod">
+          <ac:chgData name="Eric Harkat" userId="b3a6f5f8305364d9" providerId="LiveId" clId="{A53F55EA-FBA8-4B3E-9B49-50BA8991E3F2}" dt="2020-03-26T10:05:21.199" v="122" actId="20577"/>
+          <ac:spMkLst>
+            <pc:docMk/>
+            <pc:sldMk cId="3025973111" sldId="258"/>
+            <ac:spMk id="54" creationId="{1DAEA141-19AC-4C0F-80FA-A318C0161DE2}"/>
+          </ac:spMkLst>
+        </pc:spChg>
+        <pc:spChg chg="del mod">
+          <ac:chgData name="Eric Harkat" userId="b3a6f5f8305364d9" providerId="LiveId" clId="{A53F55EA-FBA8-4B3E-9B49-50BA8991E3F2}" dt="2020-03-26T10:05:31.597" v="124" actId="478"/>
+          <ac:spMkLst>
+            <pc:docMk/>
+            <pc:sldMk cId="3025973111" sldId="258"/>
+            <ac:spMk id="55" creationId="{29D189C2-C04F-490D-B8CA-85C12194C2F2}"/>
+          </ac:spMkLst>
+        </pc:spChg>
+        <pc:spChg chg="mod">
+          <ac:chgData name="Eric Harkat" userId="b3a6f5f8305364d9" providerId="LiveId" clId="{A53F55EA-FBA8-4B3E-9B49-50BA8991E3F2}" dt="2020-03-26T10:07:31.653" v="149" actId="1076"/>
+          <ac:spMkLst>
+            <pc:docMk/>
+            <pc:sldMk cId="3025973111" sldId="258"/>
+            <ac:spMk id="56" creationId="{5736101A-97E9-49AB-8652-6D862BA3C3E8}"/>
+          </ac:spMkLst>
+        </pc:spChg>
+        <pc:spChg chg="add mod">
+          <ac:chgData name="Eric Harkat" userId="b3a6f5f8305364d9" providerId="LiveId" clId="{A53F55EA-FBA8-4B3E-9B49-50BA8991E3F2}" dt="2020-03-26T10:10:48.017" v="214" actId="1076"/>
+          <ac:spMkLst>
+            <pc:docMk/>
+            <pc:sldMk cId="3025973111" sldId="258"/>
+            <ac:spMk id="77" creationId="{4B5FEED9-4B09-42B1-B38C-3C6DFEDA3BD4}"/>
+          </ac:spMkLst>
+        </pc:spChg>
+        <pc:cxnChg chg="del">
+          <ac:chgData name="Eric Harkat" userId="b3a6f5f8305364d9" providerId="LiveId" clId="{A53F55EA-FBA8-4B3E-9B49-50BA8991E3F2}" dt="2020-03-26T10:05:41.560" v="129" actId="478"/>
+          <ac:cxnSpMkLst>
+            <pc:docMk/>
+            <pc:sldMk cId="3025973111" sldId="258"/>
+            <ac:cxnSpMk id="10" creationId="{E766AE8F-AF07-4373-9B1F-623DA8900408}"/>
+          </ac:cxnSpMkLst>
+        </pc:cxnChg>
+        <pc:cxnChg chg="del">
+          <ac:chgData name="Eric Harkat" userId="b3a6f5f8305364d9" providerId="LiveId" clId="{A53F55EA-FBA8-4B3E-9B49-50BA8991E3F2}" dt="2020-03-26T10:05:48.503" v="132" actId="478"/>
+          <ac:cxnSpMkLst>
+            <pc:docMk/>
+            <pc:sldMk cId="3025973111" sldId="258"/>
+            <ac:cxnSpMk id="21" creationId="{67F6ED83-5F29-4809-AC6C-D6892A0BA8EB}"/>
+          </ac:cxnSpMkLst>
+        </pc:cxnChg>
+        <pc:cxnChg chg="mod">
+          <ac:chgData name="Eric Harkat" userId="b3a6f5f8305364d9" providerId="LiveId" clId="{A53F55EA-FBA8-4B3E-9B49-50BA8991E3F2}" dt="2020-03-26T10:07:27.757" v="148" actId="1076"/>
+          <ac:cxnSpMkLst>
+            <pc:docMk/>
+            <pc:sldMk cId="3025973111" sldId="258"/>
+            <ac:cxnSpMk id="23" creationId="{05B04222-E70B-41E5-A2F0-AA6A7DE0ECD8}"/>
+          </ac:cxnSpMkLst>
+        </pc:cxnChg>
+        <pc:cxnChg chg="mod">
+          <ac:chgData name="Eric Harkat" userId="b3a6f5f8305364d9" providerId="LiveId" clId="{A53F55EA-FBA8-4B3E-9B49-50BA8991E3F2}" dt="2020-03-26T10:09:41.983" v="176" actId="1076"/>
+          <ac:cxnSpMkLst>
+            <pc:docMk/>
+            <pc:sldMk cId="3025973111" sldId="258"/>
+            <ac:cxnSpMk id="30" creationId="{A6D8FE37-3929-4BD1-BD05-BBA0E146073E}"/>
+          </ac:cxnSpMkLst>
+        </pc:cxnChg>
+        <pc:cxnChg chg="mod">
+          <ac:chgData name="Eric Harkat" userId="b3a6f5f8305364d9" providerId="LiveId" clId="{A53F55EA-FBA8-4B3E-9B49-50BA8991E3F2}" dt="2020-03-26T09:54:59.706" v="5" actId="14100"/>
+          <ac:cxnSpMkLst>
+            <pc:docMk/>
+            <pc:sldMk cId="3025973111" sldId="258"/>
+            <ac:cxnSpMk id="32" creationId="{301F623E-3C43-40FF-998F-626FECA3F99E}"/>
+          </ac:cxnSpMkLst>
+        </pc:cxnChg>
+        <pc:cxnChg chg="del">
+          <ac:chgData name="Eric Harkat" userId="b3a6f5f8305364d9" providerId="LiveId" clId="{A53F55EA-FBA8-4B3E-9B49-50BA8991E3F2}" dt="2020-03-26T10:05:40.512" v="128" actId="478"/>
+          <ac:cxnSpMkLst>
+            <pc:docMk/>
+            <pc:sldMk cId="3025973111" sldId="258"/>
+            <ac:cxnSpMk id="34" creationId="{172FA745-47B5-4BCB-8589-08F50FB22FCE}"/>
+          </ac:cxnSpMkLst>
+        </pc:cxnChg>
+        <pc:cxnChg chg="mod">
+          <ac:chgData name="Eric Harkat" userId="b3a6f5f8305364d9" providerId="LiveId" clId="{A53F55EA-FBA8-4B3E-9B49-50BA8991E3F2}" dt="2020-03-26T10:07:20.624" v="146" actId="1076"/>
+          <ac:cxnSpMkLst>
+            <pc:docMk/>
+            <pc:sldMk cId="3025973111" sldId="258"/>
+            <ac:cxnSpMk id="36" creationId="{70910D7B-BAD0-4B3B-8C67-046A4A02B2DF}"/>
+          </ac:cxnSpMkLst>
+        </pc:cxnChg>
+        <pc:cxnChg chg="add mod">
+          <ac:chgData name="Eric Harkat" userId="b3a6f5f8305364d9" providerId="LiveId" clId="{A53F55EA-FBA8-4B3E-9B49-50BA8991E3F2}" dt="2020-03-26T10:07:46.009" v="153" actId="14100"/>
+          <ac:cxnSpMkLst>
+            <pc:docMk/>
+            <pc:sldMk cId="3025973111" sldId="258"/>
+            <ac:cxnSpMk id="37" creationId="{307E8428-4CBA-4B48-86DA-BA3C1BDED1EC}"/>
+          </ac:cxnSpMkLst>
+        </pc:cxnChg>
+        <pc:cxnChg chg="add mod">
+          <ac:chgData name="Eric Harkat" userId="b3a6f5f8305364d9" providerId="LiveId" clId="{A53F55EA-FBA8-4B3E-9B49-50BA8991E3F2}" dt="2020-03-26T10:07:43.223" v="152" actId="14100"/>
+          <ac:cxnSpMkLst>
+            <pc:docMk/>
+            <pc:sldMk cId="3025973111" sldId="258"/>
+            <ac:cxnSpMk id="38" creationId="{548AFC29-06CE-4E17-80A5-ADA20285A1DF}"/>
+          </ac:cxnSpMkLst>
+        </pc:cxnChg>
+        <pc:cxnChg chg="mod">
+          <ac:chgData name="Eric Harkat" userId="b3a6f5f8305364d9" providerId="LiveId" clId="{A53F55EA-FBA8-4B3E-9B49-50BA8991E3F2}" dt="2020-03-26T10:07:37.395" v="150" actId="14100"/>
+          <ac:cxnSpMkLst>
+            <pc:docMk/>
+            <pc:sldMk cId="3025973111" sldId="258"/>
+            <ac:cxnSpMk id="41" creationId="{838EE573-7380-4D98-81AF-C2EFF1E884CF}"/>
+          </ac:cxnSpMkLst>
+        </pc:cxnChg>
+        <pc:cxnChg chg="mod">
+          <ac:chgData name="Eric Harkat" userId="b3a6f5f8305364d9" providerId="LiveId" clId="{A53F55EA-FBA8-4B3E-9B49-50BA8991E3F2}" dt="2020-03-26T10:08:19.496" v="160" actId="14100"/>
+          <ac:cxnSpMkLst>
+            <pc:docMk/>
+            <pc:sldMk cId="3025973111" sldId="258"/>
+            <ac:cxnSpMk id="43" creationId="{3A11171A-07DF-4330-AE02-ABB9F4BBF3FF}"/>
+          </ac:cxnSpMkLst>
+        </pc:cxnChg>
+        <pc:cxnChg chg="add mod">
+          <ac:chgData name="Eric Harkat" userId="b3a6f5f8305364d9" providerId="LiveId" clId="{A53F55EA-FBA8-4B3E-9B49-50BA8991E3F2}" dt="2020-03-26T10:08:48.239" v="168" actId="14100"/>
+          <ac:cxnSpMkLst>
+            <pc:docMk/>
+            <pc:sldMk cId="3025973111" sldId="258"/>
+            <ac:cxnSpMk id="44" creationId="{EB37817F-99AD-4779-BFC7-3AB7A7E909F1}"/>
+          </ac:cxnSpMkLst>
+        </pc:cxnChg>
+        <pc:cxnChg chg="mod">
+          <ac:chgData name="Eric Harkat" userId="b3a6f5f8305364d9" providerId="LiveId" clId="{A53F55EA-FBA8-4B3E-9B49-50BA8991E3F2}" dt="2020-03-26T10:08:36.593" v="165" actId="14100"/>
+          <ac:cxnSpMkLst>
+            <pc:docMk/>
+            <pc:sldMk cId="3025973111" sldId="258"/>
+            <ac:cxnSpMk id="45" creationId="{9BE98EE9-25BE-431D-A75C-457C082A5F3C}"/>
+          </ac:cxnSpMkLst>
+        </pc:cxnChg>
+        <pc:cxnChg chg="add mod">
+          <ac:chgData name="Eric Harkat" userId="b3a6f5f8305364d9" providerId="LiveId" clId="{A53F55EA-FBA8-4B3E-9B49-50BA8991E3F2}" dt="2020-03-26T10:09:13.603" v="172" actId="14100"/>
+          <ac:cxnSpMkLst>
+            <pc:docMk/>
+            <pc:sldMk cId="3025973111" sldId="258"/>
+            <ac:cxnSpMk id="46" creationId="{428887C6-73DF-4D5E-A746-A194927CF626}"/>
+          </ac:cxnSpMkLst>
+        </pc:cxnChg>
+        <pc:cxnChg chg="mod">
+          <ac:chgData name="Eric Harkat" userId="b3a6f5f8305364d9" providerId="LiveId" clId="{A53F55EA-FBA8-4B3E-9B49-50BA8991E3F2}" dt="2020-03-26T10:09:08.231" v="170" actId="14100"/>
+          <ac:cxnSpMkLst>
+            <pc:docMk/>
+            <pc:sldMk cId="3025973111" sldId="258"/>
+            <ac:cxnSpMk id="47" creationId="{76B4D712-4293-46EA-B5EC-AE019DAB6A4F}"/>
+          </ac:cxnSpMkLst>
+        </pc:cxnChg>
+        <pc:cxnChg chg="add mod">
+          <ac:chgData name="Eric Harkat" userId="b3a6f5f8305364d9" providerId="LiveId" clId="{A53F55EA-FBA8-4B3E-9B49-50BA8991E3F2}" dt="2020-03-26T10:08:39.664" v="166" actId="14100"/>
+          <ac:cxnSpMkLst>
+            <pc:docMk/>
+            <pc:sldMk cId="3025973111" sldId="258"/>
+            <ac:cxnSpMk id="48" creationId="{A5DDA54E-BB5B-4802-911E-ECA6AEBDF264}"/>
+          </ac:cxnSpMkLst>
+        </pc:cxnChg>
+        <pc:cxnChg chg="mod">
+          <ac:chgData name="Eric Harkat" userId="b3a6f5f8305364d9" providerId="LiveId" clId="{A53F55EA-FBA8-4B3E-9B49-50BA8991E3F2}" dt="2020-03-26T10:07:48.284" v="154" actId="14100"/>
+          <ac:cxnSpMkLst>
+            <pc:docMk/>
+            <pc:sldMk cId="3025973111" sldId="258"/>
+            <ac:cxnSpMk id="49" creationId="{C71E9709-94EB-4EF2-9A7C-E2A48DF03D32}"/>
+          </ac:cxnSpMkLst>
+        </pc:cxnChg>
+        <pc:cxnChg chg="add mod">
+          <ac:chgData name="Eric Harkat" userId="b3a6f5f8305364d9" providerId="LiveId" clId="{A53F55EA-FBA8-4B3E-9B49-50BA8991E3F2}" dt="2020-03-26T10:08:44.348" v="167" actId="14100"/>
+          <ac:cxnSpMkLst>
+            <pc:docMk/>
+            <pc:sldMk cId="3025973111" sldId="258"/>
+            <ac:cxnSpMk id="50" creationId="{4C993F77-C86F-4556-819A-4C42007EE2FE}"/>
+          </ac:cxnSpMkLst>
+        </pc:cxnChg>
+        <pc:cxnChg chg="mod">
+          <ac:chgData name="Eric Harkat" userId="b3a6f5f8305364d9" providerId="LiveId" clId="{A53F55EA-FBA8-4B3E-9B49-50BA8991E3F2}" dt="2020-03-26T10:07:40.629" v="151" actId="14100"/>
+          <ac:cxnSpMkLst>
+            <pc:docMk/>
+            <pc:sldMk cId="3025973111" sldId="258"/>
+            <ac:cxnSpMk id="51" creationId="{1ECA6861-F592-4C5C-BE28-7098CF15D62F}"/>
+          </ac:cxnSpMkLst>
+        </pc:cxnChg>
+        <pc:cxnChg chg="add mod">
+          <ac:chgData name="Eric Harkat" userId="b3a6f5f8305364d9" providerId="LiveId" clId="{A53F55EA-FBA8-4B3E-9B49-50BA8991E3F2}" dt="2020-03-26T10:08:32.040" v="164" actId="14100"/>
+          <ac:cxnSpMkLst>
+            <pc:docMk/>
+            <pc:sldMk cId="3025973111" sldId="258"/>
+            <ac:cxnSpMk id="52" creationId="{F607D15A-5B82-469B-9293-6DD88D4D1620}"/>
+          </ac:cxnSpMkLst>
+        </pc:cxnChg>
+        <pc:cxnChg chg="add mod">
+          <ac:chgData name="Eric Harkat" userId="b3a6f5f8305364d9" providerId="LiveId" clId="{A53F55EA-FBA8-4B3E-9B49-50BA8991E3F2}" dt="2020-03-26T10:08:52.739" v="169" actId="14100"/>
+          <ac:cxnSpMkLst>
+            <pc:docMk/>
+            <pc:sldMk cId="3025973111" sldId="258"/>
+            <ac:cxnSpMk id="57" creationId="{785B4158-9908-417A-9AC2-49273CFC3D53}"/>
+          </ac:cxnSpMkLst>
+        </pc:cxnChg>
+        <pc:cxnChg chg="add mod">
+          <ac:chgData name="Eric Harkat" userId="b3a6f5f8305364d9" providerId="LiveId" clId="{A53F55EA-FBA8-4B3E-9B49-50BA8991E3F2}" dt="2020-03-26T10:09:16.759" v="173" actId="14100"/>
+          <ac:cxnSpMkLst>
+            <pc:docMk/>
+            <pc:sldMk cId="3025973111" sldId="258"/>
+            <ac:cxnSpMk id="58" creationId="{6B0084E8-8161-4575-9BC1-90B97A64E3A0}"/>
+          </ac:cxnSpMkLst>
+        </pc:cxnChg>
+        <pc:cxnChg chg="add mod">
+          <ac:chgData name="Eric Harkat" userId="b3a6f5f8305364d9" providerId="LiveId" clId="{A53F55EA-FBA8-4B3E-9B49-50BA8991E3F2}" dt="2020-03-26T10:07:10.485" v="143" actId="1076"/>
+          <ac:cxnSpMkLst>
+            <pc:docMk/>
+            <pc:sldMk cId="3025973111" sldId="258"/>
+            <ac:cxnSpMk id="59" creationId="{9C0AB331-2294-4B0E-ABAF-B4BF7EC13EED}"/>
+          </ac:cxnSpMkLst>
+        </pc:cxnChg>
+        <pc:cxnChg chg="add del mod">
+          <ac:chgData name="Eric Harkat" userId="b3a6f5f8305364d9" providerId="LiveId" clId="{A53F55EA-FBA8-4B3E-9B49-50BA8991E3F2}" dt="2020-03-26T10:06:33.683" v="137" actId="478"/>
+          <ac:cxnSpMkLst>
+            <pc:docMk/>
+            <pc:sldMk cId="3025973111" sldId="258"/>
+            <ac:cxnSpMk id="60" creationId="{AEF9F7BF-2977-4C59-B91B-1B90EAE0591D}"/>
+          </ac:cxnSpMkLst>
+        </pc:cxnChg>
+        <pc:cxnChg chg="add del">
+          <ac:chgData name="Eric Harkat" userId="b3a6f5f8305364d9" providerId="LiveId" clId="{A53F55EA-FBA8-4B3E-9B49-50BA8991E3F2}" dt="2020-03-26T10:06:45.614" v="139"/>
+          <ac:cxnSpMkLst>
+            <pc:docMk/>
+            <pc:sldMk cId="3025973111" sldId="258"/>
+            <ac:cxnSpMk id="61" creationId="{FB016C41-819B-4ED6-8FB5-AF59F62912C1}"/>
+          </ac:cxnSpMkLst>
+        </pc:cxnChg>
+      </pc:sldChg>
+    </pc:docChg>
+  </pc:docChgLst>
+</pc:chgInfo>
 </file>
 
 <file path=ppt/slideLayouts/slideLayout1.xml><?xml version="1.0" encoding="utf-8"?>
@@ -326,7 +680,7 @@
           <a:p>
             <a:fld id="{9AB3A824-1A51-4B26-AD58-A6D8E14F6C04}" type="datetimeFigureOut">
               <a:rPr lang="en-US" dirty="0"/>
-              <a:t>3/19/2020</a:t>
+              <a:t>3/26/2020</a:t>
             </a:fld>
             <a:endParaRPr lang="en-US" dirty="0"/>
           </a:p>
@@ -660,7 +1014,7 @@
           <a:p>
             <a:fld id="{D857E33E-8B18-4087-B112-809917729534}" type="datetimeFigureOut">
               <a:rPr lang="en-US" dirty="0"/>
-              <a:t>3/19/2020</a:t>
+              <a:t>3/26/2020</a:t>
             </a:fld>
             <a:endParaRPr lang="en-US" dirty="0"/>
           </a:p>
@@ -962,7 +1316,7 @@
           <a:p>
             <a:fld id="{D3FFE419-2371-464F-8239-3959401C3561}" type="datetimeFigureOut">
               <a:rPr lang="en-US" dirty="0"/>
-              <a:t>3/19/2020</a:t>
+              <a:t>3/26/2020</a:t>
             </a:fld>
             <a:endParaRPr lang="en-US" dirty="0"/>
           </a:p>
@@ -1209,7 +1563,7 @@
           <a:p>
             <a:fld id="{97D162C4-EDD9-4389-A98B-B87ECEA2A816}" type="datetimeFigureOut">
               <a:rPr lang="en-US" dirty="0"/>
-              <a:t>3/19/2020</a:t>
+              <a:t>3/26/2020</a:t>
             </a:fld>
             <a:endParaRPr lang="en-US" dirty="0"/>
           </a:p>
@@ -1616,7 +1970,7 @@
           <a:p>
             <a:fld id="{3E5059C3-6A89-4494-99FF-5A4D6FFD50EB}" type="datetimeFigureOut">
               <a:rPr lang="en-US" dirty="0"/>
-              <a:t>3/19/2020</a:t>
+              <a:t>3/26/2020</a:t>
             </a:fld>
             <a:endParaRPr lang="en-US" dirty="0"/>
           </a:p>
@@ -1930,7 +2284,7 @@
           <a:p>
             <a:fld id="{CA954B2F-12DE-47F5-8894-472B206D2E1E}" type="datetimeFigureOut">
               <a:rPr lang="en-US" dirty="0"/>
-              <a:t>3/19/2020</a:t>
+              <a:t>3/26/2020</a:t>
             </a:fld>
             <a:endParaRPr lang="en-US" dirty="0"/>
           </a:p>
@@ -2474,7 +2828,7 @@
           <a:p>
             <a:fld id="{3F30E46F-7819-4ACF-B48B-48222C2ACC88}" type="datetimeFigureOut">
               <a:rPr lang="en-US" dirty="0"/>
-              <a:t>3/19/2020</a:t>
+              <a:t>3/26/2020</a:t>
             </a:fld>
             <a:endParaRPr lang="en-US" dirty="0"/>
           </a:p>
@@ -2669,7 +3023,7 @@
           <a:p>
             <a:fld id="{1FAF3416-4057-4DAA-829D-4CA07428D088}" type="datetimeFigureOut">
               <a:rPr lang="en-US" dirty="0"/>
-              <a:t>3/19/2020</a:t>
+              <a:t>3/26/2020</a:t>
             </a:fld>
             <a:endParaRPr lang="en-US" dirty="0"/>
           </a:p>
@@ -2882,7 +3236,7 @@
           <a:p>
             <a:fld id="{921D9284-D300-4297-87F7-E791DCC15DB1}" type="datetimeFigureOut">
               <a:rPr lang="en-US" dirty="0"/>
-              <a:t>3/19/2020</a:t>
+              <a:t>3/26/2020</a:t>
             </a:fld>
             <a:endParaRPr lang="en-US" dirty="0"/>
           </a:p>
@@ -3251,7 +3605,7 @@
           <a:p>
             <a:fld id="{37D525BB-DA17-4BA0-B3C8-3AC3ABC827E6}" type="datetimeFigureOut">
               <a:rPr lang="en-US" dirty="0"/>
-              <a:t>3/19/2020</a:t>
+              <a:t>3/26/2020</a:t>
             </a:fld>
             <a:endParaRPr lang="en-US" dirty="0"/>
           </a:p>
@@ -3654,7 +4008,7 @@
           <a:p>
             <a:fld id="{B16C4C9A-3960-41CF-A4E9-2A8FB932454B}" type="datetimeFigureOut">
               <a:rPr lang="en-US" dirty="0"/>
-              <a:t>3/19/2020</a:t>
+              <a:t>3/26/2020</a:t>
             </a:fld>
             <a:endParaRPr lang="en-US" dirty="0"/>
           </a:p>
@@ -3965,7 +4319,7 @@
           <a:p>
             <a:fld id="{3CBC1C18-307B-4F68-A007-B5B542270E8D}" type="datetimeFigureOut">
               <a:rPr lang="en-US" dirty="0"/>
-              <a:t>3/19/2020</a:t>
+              <a:t>3/26/2020</a:t>
             </a:fld>
             <a:endParaRPr lang="en-US" dirty="0"/>
           </a:p>
@@ -4701,87 +5055,6 @@
       </p:sp>
       <p:sp>
         <p:nvSpPr>
-          <p:cNvPr id="6" name="ZoneTexte 5">
-            <a:extLst>
-              <a:ext uri="{FF2B5EF4-FFF2-40B4-BE49-F238E27FC236}">
-                <a16:creationId xmlns:a16="http://schemas.microsoft.com/office/drawing/2014/main" id="{6121C3E5-5922-4EB9-98F8-945E813F8831}"/>
-              </a:ext>
-            </a:extLst>
-          </p:cNvPr>
-          <p:cNvSpPr txBox="1"/>
-          <p:nvPr/>
-        </p:nvSpPr>
-        <p:spPr>
-          <a:xfrm>
-            <a:off x="2611808" y="3577701"/>
-            <a:ext cx="690685" cy="369332"/>
-          </a:xfrm>
-          <a:prstGeom prst="rect">
-            <a:avLst/>
-          </a:prstGeom>
-          <a:solidFill>
-            <a:schemeClr val="tx1"/>
-          </a:solidFill>
-        </p:spPr>
-        <p:txBody>
-          <a:bodyPr wrap="square" rtlCol="0">
-            <a:spAutoFit/>
-          </a:bodyPr>
-          <a:lstStyle/>
-          <a:p>
-            <a:pPr algn="ctr"/>
-            <a:r>
-              <a:rPr lang="fr-FR" dirty="0">
-                <a:solidFill>
-                  <a:schemeClr val="bg1"/>
-                </a:solidFill>
-              </a:rPr>
-              <a:t>N</a:t>
-            </a:r>
-          </a:p>
-        </p:txBody>
-      </p:sp>
-      <p:cxnSp>
-        <p:nvCxnSpPr>
-          <p:cNvPr id="10" name="Connecteur droit avec flèche 9">
-            <a:extLst>
-              <a:ext uri="{FF2B5EF4-FFF2-40B4-BE49-F238E27FC236}">
-                <a16:creationId xmlns:a16="http://schemas.microsoft.com/office/drawing/2014/main" id="{E766AE8F-AF07-4373-9B1F-623DA8900408}"/>
-              </a:ext>
-            </a:extLst>
-          </p:cNvPr>
-          <p:cNvCxnSpPr/>
-          <p:nvPr/>
-        </p:nvCxnSpPr>
-        <p:spPr>
-          <a:xfrm>
-            <a:off x="2957150" y="2929631"/>
-            <a:ext cx="0" cy="499369"/>
-          </a:xfrm>
-          <a:prstGeom prst="straightConnector1">
-            <a:avLst/>
-          </a:prstGeom>
-          <a:ln>
-            <a:tailEnd type="triangle"/>
-          </a:ln>
-        </p:spPr>
-        <p:style>
-          <a:lnRef idx="1">
-            <a:schemeClr val="accent1"/>
-          </a:lnRef>
-          <a:fillRef idx="0">
-            <a:schemeClr val="accent1"/>
-          </a:fillRef>
-          <a:effectRef idx="0">
-            <a:schemeClr val="accent1"/>
-          </a:effectRef>
-          <a:fontRef idx="minor">
-            <a:schemeClr val="tx1"/>
-          </a:fontRef>
-        </p:style>
-      </p:cxnSp>
-      <p:sp>
-        <p:nvSpPr>
           <p:cNvPr id="12" name="ZoneTexte 11">
             <a:extLst>
               <a:ext uri="{FF2B5EF4-FFF2-40B4-BE49-F238E27FC236}">
@@ -4794,8 +5067,8 @@
         </p:nvSpPr>
         <p:spPr>
           <a:xfrm>
-            <a:off x="3953816" y="3577701"/>
-            <a:ext cx="690685" cy="369332"/>
+            <a:off x="2456725" y="4481744"/>
+            <a:ext cx="1036325" cy="369332"/>
           </a:xfrm>
           <a:prstGeom prst="rect">
             <a:avLst/>
@@ -4817,7 +5090,7 @@
                   <a:schemeClr val="bg1"/>
                 </a:solidFill>
               </a:rPr>
-              <a:t>N</a:t>
+              <a:t>Thread</a:t>
             </a:r>
           </a:p>
         </p:txBody>
@@ -4836,7 +5109,7 @@
         </p:nvSpPr>
         <p:spPr>
           <a:xfrm>
-            <a:off x="5295824" y="3577701"/>
+            <a:off x="4836254" y="4480210"/>
             <a:ext cx="690685" cy="369332"/>
           </a:xfrm>
           <a:prstGeom prst="rect">
@@ -5004,7 +5277,7 @@
         </p:nvSpPr>
         <p:spPr>
           <a:xfrm>
-            <a:off x="8286119" y="2673658"/>
+            <a:off x="8611935" y="3088359"/>
             <a:ext cx="690685" cy="369332"/>
           </a:xfrm>
           <a:prstGeom prst="rect">
@@ -5046,7 +5319,7 @@
         </p:nvSpPr>
         <p:spPr>
           <a:xfrm>
-            <a:off x="8286119" y="3577701"/>
+            <a:off x="8594179" y="3884553"/>
             <a:ext cx="690685" cy="369332"/>
           </a:xfrm>
           <a:prstGeom prst="rect">
@@ -5088,7 +5361,7 @@
         </p:nvSpPr>
         <p:spPr>
           <a:xfrm>
-            <a:off x="8287005" y="4481744"/>
+            <a:off x="6667131" y="6105164"/>
             <a:ext cx="690685" cy="369332"/>
           </a:xfrm>
           <a:prstGeom prst="rect">
@@ -5116,45 +5389,6 @@
           </a:p>
         </p:txBody>
       </p:sp>
-      <p:cxnSp>
-        <p:nvCxnSpPr>
-          <p:cNvPr id="21" name="Connecteur droit avec flèche 20">
-            <a:extLst>
-              <a:ext uri="{FF2B5EF4-FFF2-40B4-BE49-F238E27FC236}">
-                <a16:creationId xmlns:a16="http://schemas.microsoft.com/office/drawing/2014/main" id="{67F6ED83-5F29-4809-AC6C-D6892A0BA8EB}"/>
-              </a:ext>
-            </a:extLst>
-          </p:cNvPr>
-          <p:cNvCxnSpPr/>
-          <p:nvPr/>
-        </p:nvCxnSpPr>
-        <p:spPr>
-          <a:xfrm>
-            <a:off x="4299158" y="2929631"/>
-            <a:ext cx="0" cy="499369"/>
-          </a:xfrm>
-          <a:prstGeom prst="straightConnector1">
-            <a:avLst/>
-          </a:prstGeom>
-          <a:ln>
-            <a:tailEnd type="triangle"/>
-          </a:ln>
-        </p:spPr>
-        <p:style>
-          <a:lnRef idx="1">
-            <a:schemeClr val="accent1"/>
-          </a:lnRef>
-          <a:fillRef idx="0">
-            <a:schemeClr val="accent1"/>
-          </a:fillRef>
-          <a:effectRef idx="0">
-            <a:schemeClr val="accent1"/>
-          </a:effectRef>
-          <a:fontRef idx="minor">
-            <a:schemeClr val="tx1"/>
-          </a:fontRef>
-        </p:style>
-      </p:cxnSp>
       <p:cxnSp>
         <p:nvCxnSpPr>
           <p:cNvPr id="23" name="Connecteur droit avec flèche 22">
@@ -5169,7 +5403,7 @@
         </p:nvCxnSpPr>
         <p:spPr>
           <a:xfrm>
-            <a:off x="5641166" y="2929631"/>
+            <a:off x="5181596" y="3762367"/>
             <a:ext cx="0" cy="568171"/>
           </a:xfrm>
           <a:prstGeom prst="straightConnector1">
@@ -5194,42 +5428,6 @@
           </a:fontRef>
         </p:style>
       </p:cxnSp>
-      <p:sp>
-        <p:nvSpPr>
-          <p:cNvPr id="24" name="ZoneTexte 23">
-            <a:extLst>
-              <a:ext uri="{FF2B5EF4-FFF2-40B4-BE49-F238E27FC236}">
-                <a16:creationId xmlns:a16="http://schemas.microsoft.com/office/drawing/2014/main" id="{0033B484-A743-4154-86CA-4F7240CF00D9}"/>
-              </a:ext>
-            </a:extLst>
-          </p:cNvPr>
-          <p:cNvSpPr txBox="1"/>
-          <p:nvPr/>
-        </p:nvSpPr>
-        <p:spPr>
-          <a:xfrm>
-            <a:off x="2251379" y="2631623"/>
-            <a:ext cx="1411542" cy="246221"/>
-          </a:xfrm>
-          <a:prstGeom prst="rect">
-            <a:avLst/>
-          </a:prstGeom>
-          <a:noFill/>
-        </p:spPr>
-        <p:txBody>
-          <a:bodyPr wrap="square" rtlCol="0">
-            <a:spAutoFit/>
-          </a:bodyPr>
-          <a:lstStyle/>
-          <a:p>
-            <a:pPr algn="ctr"/>
-            <a:r>
-              <a:rPr lang="fr-FR" sz="1000" dirty="0"/>
-              <a:t>Neurone qui écoute</a:t>
-            </a:r>
-          </a:p>
-        </p:txBody>
-      </p:sp>
       <p:cxnSp>
         <p:nvCxnSpPr>
           <p:cNvPr id="30" name="Connecteur droit 29">
@@ -5239,13 +5437,15 @@
               </a:ext>
             </a:extLst>
           </p:cNvPr>
-          <p:cNvCxnSpPr/>
+          <p:cNvCxnSpPr>
+            <a:cxnSpLocks/>
+          </p:cNvCxnSpPr>
           <p:nvPr/>
         </p:nvCxnSpPr>
         <p:spPr>
           <a:xfrm>
-            <a:off x="6214369" y="2112885"/>
-            <a:ext cx="0" cy="3648723"/>
+            <a:off x="6019060" y="2149732"/>
+            <a:ext cx="0" cy="4361611"/>
           </a:xfrm>
           <a:prstGeom prst="line">
             <a:avLst/>
@@ -5275,59 +5475,19 @@
               </a:ext>
             </a:extLst>
           </p:cNvPr>
-          <p:cNvCxnSpPr/>
+          <p:cNvCxnSpPr>
+            <a:cxnSpLocks/>
+          </p:cNvCxnSpPr>
           <p:nvPr/>
         </p:nvCxnSpPr>
         <p:spPr>
           <a:xfrm>
             <a:off x="7865616" y="2032986"/>
-            <a:ext cx="0" cy="3728622"/>
+            <a:ext cx="0" cy="4441510"/>
           </a:xfrm>
           <a:prstGeom prst="line">
             <a:avLst/>
           </a:prstGeom>
-        </p:spPr>
-        <p:style>
-          <a:lnRef idx="1">
-            <a:schemeClr val="accent1"/>
-          </a:lnRef>
-          <a:fillRef idx="0">
-            <a:schemeClr val="accent1"/>
-          </a:fillRef>
-          <a:effectRef idx="0">
-            <a:schemeClr val="accent1"/>
-          </a:effectRef>
-          <a:fontRef idx="minor">
-            <a:schemeClr val="tx1"/>
-          </a:fontRef>
-        </p:style>
-      </p:cxnSp>
-      <p:cxnSp>
-        <p:nvCxnSpPr>
-          <p:cNvPr id="34" name="Connecteur droit avec flèche 33">
-            <a:extLst>
-              <a:ext uri="{FF2B5EF4-FFF2-40B4-BE49-F238E27FC236}">
-                <a16:creationId xmlns:a16="http://schemas.microsoft.com/office/drawing/2014/main" id="{172FA745-47B5-4BCB-8589-08F50FB22FCE}"/>
-              </a:ext>
-            </a:extLst>
-          </p:cNvPr>
-          <p:cNvCxnSpPr/>
-          <p:nvPr/>
-        </p:nvCxnSpPr>
-        <p:spPr>
-          <a:xfrm>
-            <a:off x="3373515" y="3764132"/>
-            <a:ext cx="435005" cy="0"/>
-          </a:xfrm>
-          <a:prstGeom prst="straightConnector1">
-            <a:avLst/>
-          </a:prstGeom>
-          <a:ln>
-            <a:solidFill>
-              <a:schemeClr val="tx1"/>
-            </a:solidFill>
-            <a:tailEnd type="triangle"/>
-          </a:ln>
         </p:spPr>
         <p:style>
           <a:lnRef idx="1">
@@ -5358,7 +5518,7 @@
         </p:nvCxnSpPr>
         <p:spPr>
           <a:xfrm>
-            <a:off x="4722920" y="3764132"/>
+            <a:off x="3975400" y="4638243"/>
             <a:ext cx="461639" cy="0"/>
           </a:xfrm>
           <a:prstGeom prst="straightConnector1">
@@ -5395,13 +5555,15 @@
               </a:ext>
             </a:extLst>
           </p:cNvPr>
-          <p:cNvCxnSpPr/>
+          <p:cNvCxnSpPr>
+            <a:cxnSpLocks/>
+          </p:cNvCxnSpPr>
           <p:nvPr/>
         </p:nvCxnSpPr>
         <p:spPr>
           <a:xfrm flipV="1">
-            <a:off x="6096000" y="2877844"/>
-            <a:ext cx="402454" cy="815267"/>
+            <a:off x="5660992" y="2867639"/>
+            <a:ext cx="888956" cy="1663657"/>
           </a:xfrm>
           <a:prstGeom prst="straightConnector1">
             <a:avLst/>
@@ -5437,13 +5599,15 @@
               </a:ext>
             </a:extLst>
           </p:cNvPr>
-          <p:cNvCxnSpPr/>
+          <p:cNvCxnSpPr>
+            <a:cxnSpLocks/>
+          </p:cNvCxnSpPr>
           <p:nvPr/>
         </p:nvCxnSpPr>
         <p:spPr>
           <a:xfrm>
             <a:off x="7412854" y="2877844"/>
-            <a:ext cx="719092" cy="0"/>
+            <a:ext cx="1065321" cy="310617"/>
           </a:xfrm>
           <a:prstGeom prst="straightConnector1">
             <a:avLst/>
@@ -5479,13 +5643,15 @@
               </a:ext>
             </a:extLst>
           </p:cNvPr>
-          <p:cNvCxnSpPr/>
+          <p:cNvCxnSpPr>
+            <a:cxnSpLocks/>
+          </p:cNvCxnSpPr>
           <p:nvPr/>
         </p:nvCxnSpPr>
         <p:spPr>
           <a:xfrm>
             <a:off x="7412854" y="3764132"/>
-            <a:ext cx="719092" cy="0"/>
+            <a:ext cx="1065321" cy="395564"/>
           </a:xfrm>
           <a:prstGeom prst="straightConnector1">
             <a:avLst/>
@@ -5521,13 +5687,15 @@
               </a:ext>
             </a:extLst>
           </p:cNvPr>
-          <p:cNvCxnSpPr/>
+          <p:cNvCxnSpPr>
+            <a:cxnSpLocks/>
+          </p:cNvCxnSpPr>
           <p:nvPr/>
         </p:nvCxnSpPr>
         <p:spPr>
-          <a:xfrm>
-            <a:off x="7412854" y="4651899"/>
-            <a:ext cx="719092" cy="0"/>
+          <a:xfrm flipV="1">
+            <a:off x="7448862" y="5116142"/>
+            <a:ext cx="1029313" cy="251892"/>
           </a:xfrm>
           <a:prstGeom prst="straightConnector1">
             <a:avLst/>
@@ -5563,13 +5731,15 @@
               </a:ext>
             </a:extLst>
           </p:cNvPr>
-          <p:cNvCxnSpPr/>
+          <p:cNvCxnSpPr>
+            <a:cxnSpLocks/>
+          </p:cNvCxnSpPr>
           <p:nvPr/>
         </p:nvCxnSpPr>
         <p:spPr>
           <a:xfrm>
-            <a:off x="6096000" y="3764132"/>
-            <a:ext cx="473476" cy="0"/>
+            <a:off x="5907917" y="4664876"/>
+            <a:ext cx="684063" cy="1534"/>
           </a:xfrm>
           <a:prstGeom prst="straightConnector1">
             <a:avLst/>
@@ -5605,13 +5775,15 @@
               </a:ext>
             </a:extLst>
           </p:cNvPr>
-          <p:cNvCxnSpPr/>
+          <p:cNvCxnSpPr>
+            <a:cxnSpLocks/>
+          </p:cNvCxnSpPr>
           <p:nvPr/>
         </p:nvCxnSpPr>
         <p:spPr>
           <a:xfrm>
-            <a:off x="6096000" y="3870664"/>
-            <a:ext cx="402454" cy="781235"/>
+            <a:off x="5660697" y="4795472"/>
+            <a:ext cx="923579" cy="1445530"/>
           </a:xfrm>
           <a:prstGeom prst="straightConnector1">
             <a:avLst/>
@@ -5669,7 +5841,7 @@
             <a:pPr algn="ctr"/>
             <a:r>
               <a:rPr lang="fr-FR" sz="1000" dirty="0"/>
-              <a:t>Neurone de contrôle</a:t>
+              <a:t>Neurone composant</a:t>
             </a:r>
           </a:p>
         </p:txBody>
@@ -5688,8 +5860,8 @@
         </p:nvSpPr>
         <p:spPr>
           <a:xfrm>
-            <a:off x="8190943" y="2066563"/>
-            <a:ext cx="1550425" cy="246221"/>
+            <a:off x="8148463" y="2066563"/>
+            <a:ext cx="1635384" cy="246221"/>
           </a:xfrm>
           <a:prstGeom prst="rect">
             <a:avLst/>
@@ -5704,42 +5876,7 @@
             <a:pPr algn="ctr"/>
             <a:r>
               <a:rPr lang="fr-FR" sz="1000" dirty="0"/>
-              <a:t>Neurone de sauvegarde</a:t>
-            </a:r>
-          </a:p>
-        </p:txBody>
-      </p:sp>
-      <p:sp>
-        <p:nvSpPr>
-          <p:cNvPr id="55" name="Rectangle 54">
-            <a:extLst>
-              <a:ext uri="{FF2B5EF4-FFF2-40B4-BE49-F238E27FC236}">
-                <a16:creationId xmlns:a16="http://schemas.microsoft.com/office/drawing/2014/main" id="{29D189C2-C04F-490D-B8CA-85C12194C2F2}"/>
-              </a:ext>
-            </a:extLst>
-          </p:cNvPr>
-          <p:cNvSpPr/>
-          <p:nvPr/>
-        </p:nvSpPr>
-        <p:spPr>
-          <a:xfrm>
-            <a:off x="5076231" y="2621417"/>
-            <a:ext cx="1042273" cy="246221"/>
-          </a:xfrm>
-          <a:prstGeom prst="rect">
-            <a:avLst/>
-          </a:prstGeom>
-        </p:spPr>
-        <p:txBody>
-          <a:bodyPr wrap="none">
-            <a:spAutoFit/>
-          </a:bodyPr>
-          <a:lstStyle/>
-          <a:p>
-            <a:pPr algn="ctr"/>
-            <a:r>
-              <a:rPr lang="fr-FR" sz="1000" dirty="0"/>
-              <a:t>Neurone rooter</a:t>
+              <a:t>Neurone de fonctionnalité</a:t>
             </a:r>
           </a:p>
         </p:txBody>
@@ -5758,7 +5895,7 @@
         </p:nvSpPr>
         <p:spPr>
           <a:xfrm>
-            <a:off x="3572838" y="2631622"/>
+            <a:off x="4455275" y="3404586"/>
             <a:ext cx="1452642" cy="246221"/>
           </a:xfrm>
           <a:prstGeom prst="rect">
@@ -5775,6 +5912,602 @@
             <a:r>
               <a:rPr lang="fr-FR" sz="1000" dirty="0"/>
               <a:t>Neurone de traitement</a:t>
+            </a:r>
+          </a:p>
+        </p:txBody>
+      </p:sp>
+      <p:sp>
+        <p:nvSpPr>
+          <p:cNvPr id="31" name="ZoneTexte 30">
+            <a:extLst>
+              <a:ext uri="{FF2B5EF4-FFF2-40B4-BE49-F238E27FC236}">
+                <a16:creationId xmlns:a16="http://schemas.microsoft.com/office/drawing/2014/main" id="{90009500-BADC-4794-BEB6-543C81F9F8D6}"/>
+              </a:ext>
+            </a:extLst>
+          </p:cNvPr>
+          <p:cNvSpPr txBox="1"/>
+          <p:nvPr/>
+        </p:nvSpPr>
+        <p:spPr>
+          <a:xfrm>
+            <a:off x="6667132" y="5266410"/>
+            <a:ext cx="690685" cy="369332"/>
+          </a:xfrm>
+          <a:prstGeom prst="rect">
+            <a:avLst/>
+          </a:prstGeom>
+          <a:solidFill>
+            <a:schemeClr val="tx1"/>
+          </a:solidFill>
+        </p:spPr>
+        <p:txBody>
+          <a:bodyPr wrap="square" rtlCol="0">
+            <a:spAutoFit/>
+          </a:bodyPr>
+          <a:lstStyle/>
+          <a:p>
+            <a:pPr algn="ctr"/>
+            <a:r>
+              <a:rPr lang="fr-FR" dirty="0">
+                <a:solidFill>
+                  <a:schemeClr val="bg1"/>
+                </a:solidFill>
+              </a:rPr>
+              <a:t>N</a:t>
+            </a:r>
+          </a:p>
+        </p:txBody>
+      </p:sp>
+      <p:sp>
+        <p:nvSpPr>
+          <p:cNvPr id="33" name="ZoneTexte 32">
+            <a:extLst>
+              <a:ext uri="{FF2B5EF4-FFF2-40B4-BE49-F238E27FC236}">
+                <a16:creationId xmlns:a16="http://schemas.microsoft.com/office/drawing/2014/main" id="{18191BDD-E59B-4869-A146-CB692938E9B7}"/>
+              </a:ext>
+            </a:extLst>
+          </p:cNvPr>
+          <p:cNvSpPr txBox="1"/>
+          <p:nvPr/>
+        </p:nvSpPr>
+        <p:spPr>
+          <a:xfrm>
+            <a:off x="8591751" y="4897078"/>
+            <a:ext cx="690685" cy="369332"/>
+          </a:xfrm>
+          <a:prstGeom prst="rect">
+            <a:avLst/>
+          </a:prstGeom>
+          <a:solidFill>
+            <a:schemeClr val="tx1"/>
+          </a:solidFill>
+        </p:spPr>
+        <p:txBody>
+          <a:bodyPr wrap="square" rtlCol="0">
+            <a:spAutoFit/>
+          </a:bodyPr>
+          <a:lstStyle/>
+          <a:p>
+            <a:pPr algn="ctr"/>
+            <a:r>
+              <a:rPr lang="fr-FR" dirty="0">
+                <a:solidFill>
+                  <a:schemeClr val="bg1"/>
+                </a:solidFill>
+              </a:rPr>
+              <a:t>N</a:t>
+            </a:r>
+          </a:p>
+        </p:txBody>
+      </p:sp>
+      <p:sp>
+        <p:nvSpPr>
+          <p:cNvPr id="35" name="ZoneTexte 34">
+            <a:extLst>
+              <a:ext uri="{FF2B5EF4-FFF2-40B4-BE49-F238E27FC236}">
+                <a16:creationId xmlns:a16="http://schemas.microsoft.com/office/drawing/2014/main" id="{C4277E52-086C-43C6-BE30-351AB033B209}"/>
+              </a:ext>
+            </a:extLst>
+          </p:cNvPr>
+          <p:cNvSpPr txBox="1"/>
+          <p:nvPr/>
+        </p:nvSpPr>
+        <p:spPr>
+          <a:xfrm>
+            <a:off x="8620812" y="5696893"/>
+            <a:ext cx="690685" cy="369332"/>
+          </a:xfrm>
+          <a:prstGeom prst="rect">
+            <a:avLst/>
+          </a:prstGeom>
+          <a:solidFill>
+            <a:schemeClr val="tx1"/>
+          </a:solidFill>
+        </p:spPr>
+        <p:txBody>
+          <a:bodyPr wrap="square" rtlCol="0">
+            <a:spAutoFit/>
+          </a:bodyPr>
+          <a:lstStyle/>
+          <a:p>
+            <a:pPr algn="ctr"/>
+            <a:r>
+              <a:rPr lang="fr-FR" dirty="0">
+                <a:solidFill>
+                  <a:schemeClr val="bg1"/>
+                </a:solidFill>
+              </a:rPr>
+              <a:t>N</a:t>
+            </a:r>
+          </a:p>
+        </p:txBody>
+      </p:sp>
+      <p:cxnSp>
+        <p:nvCxnSpPr>
+          <p:cNvPr id="37" name="Connecteur droit avec flèche 36">
+            <a:extLst>
+              <a:ext uri="{FF2B5EF4-FFF2-40B4-BE49-F238E27FC236}">
+                <a16:creationId xmlns:a16="http://schemas.microsoft.com/office/drawing/2014/main" id="{307E8428-4CBA-4B48-86DA-BA3C1BDED1EC}"/>
+              </a:ext>
+            </a:extLst>
+          </p:cNvPr>
+          <p:cNvCxnSpPr>
+            <a:cxnSpLocks/>
+          </p:cNvCxnSpPr>
+          <p:nvPr/>
+        </p:nvCxnSpPr>
+        <p:spPr>
+          <a:xfrm>
+            <a:off x="5783505" y="4749150"/>
+            <a:ext cx="769988" cy="618883"/>
+          </a:xfrm>
+          <a:prstGeom prst="straightConnector1">
+            <a:avLst/>
+          </a:prstGeom>
+          <a:ln>
+            <a:solidFill>
+              <a:schemeClr val="tx1"/>
+            </a:solidFill>
+            <a:tailEnd type="triangle"/>
+          </a:ln>
+        </p:spPr>
+        <p:style>
+          <a:lnRef idx="1">
+            <a:schemeClr val="accent1"/>
+          </a:lnRef>
+          <a:fillRef idx="0">
+            <a:schemeClr val="accent1"/>
+          </a:fillRef>
+          <a:effectRef idx="0">
+            <a:schemeClr val="accent1"/>
+          </a:effectRef>
+          <a:fontRef idx="minor">
+            <a:schemeClr val="tx1"/>
+          </a:fontRef>
+        </p:style>
+      </p:cxnSp>
+      <p:cxnSp>
+        <p:nvCxnSpPr>
+          <p:cNvPr id="38" name="Connecteur droit avec flèche 37">
+            <a:extLst>
+              <a:ext uri="{FF2B5EF4-FFF2-40B4-BE49-F238E27FC236}">
+                <a16:creationId xmlns:a16="http://schemas.microsoft.com/office/drawing/2014/main" id="{548AFC29-06CE-4E17-80A5-ADA20285A1DF}"/>
+              </a:ext>
+            </a:extLst>
+          </p:cNvPr>
+          <p:cNvCxnSpPr>
+            <a:cxnSpLocks/>
+          </p:cNvCxnSpPr>
+          <p:nvPr/>
+        </p:nvCxnSpPr>
+        <p:spPr>
+          <a:xfrm flipV="1">
+            <a:off x="5751409" y="3884553"/>
+            <a:ext cx="752664" cy="693065"/>
+          </a:xfrm>
+          <a:prstGeom prst="straightConnector1">
+            <a:avLst/>
+          </a:prstGeom>
+          <a:ln>
+            <a:solidFill>
+              <a:schemeClr val="tx1"/>
+            </a:solidFill>
+            <a:tailEnd type="triangle"/>
+          </a:ln>
+        </p:spPr>
+        <p:style>
+          <a:lnRef idx="1">
+            <a:schemeClr val="accent1"/>
+          </a:lnRef>
+          <a:fillRef idx="0">
+            <a:schemeClr val="accent1"/>
+          </a:fillRef>
+          <a:effectRef idx="0">
+            <a:schemeClr val="accent1"/>
+          </a:effectRef>
+          <a:fontRef idx="minor">
+            <a:schemeClr val="tx1"/>
+          </a:fontRef>
+        </p:style>
+      </p:cxnSp>
+      <p:cxnSp>
+        <p:nvCxnSpPr>
+          <p:cNvPr id="44" name="Connecteur droit avec flèche 43">
+            <a:extLst>
+              <a:ext uri="{FF2B5EF4-FFF2-40B4-BE49-F238E27FC236}">
+                <a16:creationId xmlns:a16="http://schemas.microsoft.com/office/drawing/2014/main" id="{EB37817F-99AD-4779-BFC7-3AB7A7E909F1}"/>
+              </a:ext>
+            </a:extLst>
+          </p:cNvPr>
+          <p:cNvCxnSpPr>
+            <a:cxnSpLocks/>
+          </p:cNvCxnSpPr>
+          <p:nvPr/>
+        </p:nvCxnSpPr>
+        <p:spPr>
+          <a:xfrm>
+            <a:off x="7412854" y="4692238"/>
+            <a:ext cx="1065321" cy="329815"/>
+          </a:xfrm>
+          <a:prstGeom prst="straightConnector1">
+            <a:avLst/>
+          </a:prstGeom>
+          <a:ln>
+            <a:solidFill>
+              <a:schemeClr val="tx1"/>
+            </a:solidFill>
+            <a:tailEnd type="triangle"/>
+          </a:ln>
+        </p:spPr>
+        <p:style>
+          <a:lnRef idx="1">
+            <a:schemeClr val="accent1"/>
+          </a:lnRef>
+          <a:fillRef idx="0">
+            <a:schemeClr val="accent1"/>
+          </a:fillRef>
+          <a:effectRef idx="0">
+            <a:schemeClr val="accent1"/>
+          </a:effectRef>
+          <a:fontRef idx="minor">
+            <a:schemeClr val="tx1"/>
+          </a:fontRef>
+        </p:style>
+      </p:cxnSp>
+      <p:cxnSp>
+        <p:nvCxnSpPr>
+          <p:cNvPr id="46" name="Connecteur droit avec flèche 45">
+            <a:extLst>
+              <a:ext uri="{FF2B5EF4-FFF2-40B4-BE49-F238E27FC236}">
+                <a16:creationId xmlns:a16="http://schemas.microsoft.com/office/drawing/2014/main" id="{428887C6-73DF-4D5E-A746-A194927CF626}"/>
+              </a:ext>
+            </a:extLst>
+          </p:cNvPr>
+          <p:cNvCxnSpPr>
+            <a:cxnSpLocks/>
+          </p:cNvCxnSpPr>
+          <p:nvPr/>
+        </p:nvCxnSpPr>
+        <p:spPr>
+          <a:xfrm>
+            <a:off x="7448862" y="5496237"/>
+            <a:ext cx="1089575" cy="279268"/>
+          </a:xfrm>
+          <a:prstGeom prst="straightConnector1">
+            <a:avLst/>
+          </a:prstGeom>
+          <a:ln>
+            <a:solidFill>
+              <a:schemeClr val="tx1"/>
+            </a:solidFill>
+            <a:tailEnd type="triangle"/>
+          </a:ln>
+        </p:spPr>
+        <p:style>
+          <a:lnRef idx="1">
+            <a:schemeClr val="accent1"/>
+          </a:lnRef>
+          <a:fillRef idx="0">
+            <a:schemeClr val="accent1"/>
+          </a:fillRef>
+          <a:effectRef idx="0">
+            <a:schemeClr val="accent1"/>
+          </a:effectRef>
+          <a:fontRef idx="minor">
+            <a:schemeClr val="tx1"/>
+          </a:fontRef>
+        </p:style>
+      </p:cxnSp>
+      <p:cxnSp>
+        <p:nvCxnSpPr>
+          <p:cNvPr id="48" name="Connecteur droit avec flèche 47">
+            <a:extLst>
+              <a:ext uri="{FF2B5EF4-FFF2-40B4-BE49-F238E27FC236}">
+                <a16:creationId xmlns:a16="http://schemas.microsoft.com/office/drawing/2014/main" id="{A5DDA54E-BB5B-4802-911E-ECA6AEBDF264}"/>
+              </a:ext>
+            </a:extLst>
+          </p:cNvPr>
+          <p:cNvCxnSpPr>
+            <a:cxnSpLocks/>
+          </p:cNvCxnSpPr>
+          <p:nvPr/>
+        </p:nvCxnSpPr>
+        <p:spPr>
+          <a:xfrm flipV="1">
+            <a:off x="7448862" y="3380084"/>
+            <a:ext cx="1029313" cy="288813"/>
+          </a:xfrm>
+          <a:prstGeom prst="straightConnector1">
+            <a:avLst/>
+          </a:prstGeom>
+          <a:ln>
+            <a:solidFill>
+              <a:schemeClr val="tx1"/>
+            </a:solidFill>
+            <a:tailEnd type="triangle"/>
+          </a:ln>
+        </p:spPr>
+        <p:style>
+          <a:lnRef idx="1">
+            <a:schemeClr val="accent1"/>
+          </a:lnRef>
+          <a:fillRef idx="0">
+            <a:schemeClr val="accent1"/>
+          </a:fillRef>
+          <a:effectRef idx="0">
+            <a:schemeClr val="accent1"/>
+          </a:effectRef>
+          <a:fontRef idx="minor">
+            <a:schemeClr val="tx1"/>
+          </a:fontRef>
+        </p:style>
+      </p:cxnSp>
+      <p:cxnSp>
+        <p:nvCxnSpPr>
+          <p:cNvPr id="50" name="Connecteur droit avec flèche 49">
+            <a:extLst>
+              <a:ext uri="{FF2B5EF4-FFF2-40B4-BE49-F238E27FC236}">
+                <a16:creationId xmlns:a16="http://schemas.microsoft.com/office/drawing/2014/main" id="{4C993F77-C86F-4556-819A-4C42007EE2FE}"/>
+              </a:ext>
+            </a:extLst>
+          </p:cNvPr>
+          <p:cNvCxnSpPr>
+            <a:cxnSpLocks/>
+          </p:cNvCxnSpPr>
+          <p:nvPr/>
+        </p:nvCxnSpPr>
+        <p:spPr>
+          <a:xfrm flipV="1">
+            <a:off x="7403259" y="4213691"/>
+            <a:ext cx="1074916" cy="424552"/>
+          </a:xfrm>
+          <a:prstGeom prst="straightConnector1">
+            <a:avLst/>
+          </a:prstGeom>
+          <a:ln>
+            <a:solidFill>
+              <a:schemeClr val="tx1"/>
+            </a:solidFill>
+            <a:tailEnd type="triangle"/>
+          </a:ln>
+        </p:spPr>
+        <p:style>
+          <a:lnRef idx="1">
+            <a:schemeClr val="accent1"/>
+          </a:lnRef>
+          <a:fillRef idx="0">
+            <a:schemeClr val="accent1"/>
+          </a:fillRef>
+          <a:effectRef idx="0">
+            <a:schemeClr val="accent1"/>
+          </a:effectRef>
+          <a:fontRef idx="minor">
+            <a:schemeClr val="tx1"/>
+          </a:fontRef>
+        </p:style>
+      </p:cxnSp>
+      <p:cxnSp>
+        <p:nvCxnSpPr>
+          <p:cNvPr id="52" name="Connecteur droit avec flèche 51">
+            <a:extLst>
+              <a:ext uri="{FF2B5EF4-FFF2-40B4-BE49-F238E27FC236}">
+                <a16:creationId xmlns:a16="http://schemas.microsoft.com/office/drawing/2014/main" id="{F607D15A-5B82-469B-9293-6DD88D4D1620}"/>
+              </a:ext>
+            </a:extLst>
+          </p:cNvPr>
+          <p:cNvCxnSpPr>
+            <a:cxnSpLocks/>
+          </p:cNvCxnSpPr>
+          <p:nvPr/>
+        </p:nvCxnSpPr>
+        <p:spPr>
+          <a:xfrm>
+            <a:off x="7427761" y="2992183"/>
+            <a:ext cx="1050414" cy="975934"/>
+          </a:xfrm>
+          <a:prstGeom prst="straightConnector1">
+            <a:avLst/>
+          </a:prstGeom>
+          <a:ln>
+            <a:solidFill>
+              <a:schemeClr val="tx1"/>
+            </a:solidFill>
+            <a:tailEnd type="triangle"/>
+          </a:ln>
+        </p:spPr>
+        <p:style>
+          <a:lnRef idx="1">
+            <a:schemeClr val="accent1"/>
+          </a:lnRef>
+          <a:fillRef idx="0">
+            <a:schemeClr val="accent1"/>
+          </a:fillRef>
+          <a:effectRef idx="0">
+            <a:schemeClr val="accent1"/>
+          </a:effectRef>
+          <a:fontRef idx="minor">
+            <a:schemeClr val="tx1"/>
+          </a:fontRef>
+        </p:style>
+      </p:cxnSp>
+      <p:cxnSp>
+        <p:nvCxnSpPr>
+          <p:cNvPr id="57" name="Connecteur droit avec flèche 56">
+            <a:extLst>
+              <a:ext uri="{FF2B5EF4-FFF2-40B4-BE49-F238E27FC236}">
+                <a16:creationId xmlns:a16="http://schemas.microsoft.com/office/drawing/2014/main" id="{785B4158-9908-417A-9AC2-49273CFC3D53}"/>
+              </a:ext>
+            </a:extLst>
+          </p:cNvPr>
+          <p:cNvCxnSpPr>
+            <a:cxnSpLocks/>
+          </p:cNvCxnSpPr>
+          <p:nvPr/>
+        </p:nvCxnSpPr>
+        <p:spPr>
+          <a:xfrm flipV="1">
+            <a:off x="7418079" y="5184926"/>
+            <a:ext cx="1060096" cy="1181159"/>
+          </a:xfrm>
+          <a:prstGeom prst="straightConnector1">
+            <a:avLst/>
+          </a:prstGeom>
+          <a:ln>
+            <a:solidFill>
+              <a:schemeClr val="tx1"/>
+            </a:solidFill>
+            <a:tailEnd type="triangle"/>
+          </a:ln>
+        </p:spPr>
+        <p:style>
+          <a:lnRef idx="1">
+            <a:schemeClr val="accent1"/>
+          </a:lnRef>
+          <a:fillRef idx="0">
+            <a:schemeClr val="accent1"/>
+          </a:fillRef>
+          <a:effectRef idx="0">
+            <a:schemeClr val="accent1"/>
+          </a:effectRef>
+          <a:fontRef idx="minor">
+            <a:schemeClr val="tx1"/>
+          </a:fontRef>
+        </p:style>
+      </p:cxnSp>
+      <p:cxnSp>
+        <p:nvCxnSpPr>
+          <p:cNvPr id="58" name="Connecteur droit avec flèche 57">
+            <a:extLst>
+              <a:ext uri="{FF2B5EF4-FFF2-40B4-BE49-F238E27FC236}">
+                <a16:creationId xmlns:a16="http://schemas.microsoft.com/office/drawing/2014/main" id="{6B0084E8-8161-4575-9BC1-90B97A64E3A0}"/>
+              </a:ext>
+            </a:extLst>
+          </p:cNvPr>
+          <p:cNvCxnSpPr>
+            <a:cxnSpLocks/>
+          </p:cNvCxnSpPr>
+          <p:nvPr/>
+        </p:nvCxnSpPr>
+        <p:spPr>
+          <a:xfrm flipV="1">
+            <a:off x="7448862" y="5923206"/>
+            <a:ext cx="1089575" cy="538113"/>
+          </a:xfrm>
+          <a:prstGeom prst="straightConnector1">
+            <a:avLst/>
+          </a:prstGeom>
+          <a:ln>
+            <a:solidFill>
+              <a:schemeClr val="tx1"/>
+            </a:solidFill>
+            <a:tailEnd type="triangle"/>
+          </a:ln>
+        </p:spPr>
+        <p:style>
+          <a:lnRef idx="1">
+            <a:schemeClr val="accent1"/>
+          </a:lnRef>
+          <a:fillRef idx="0">
+            <a:schemeClr val="accent1"/>
+          </a:fillRef>
+          <a:effectRef idx="0">
+            <a:schemeClr val="accent1"/>
+          </a:effectRef>
+          <a:fontRef idx="minor">
+            <a:schemeClr val="tx1"/>
+          </a:fontRef>
+        </p:style>
+      </p:cxnSp>
+      <p:cxnSp>
+        <p:nvCxnSpPr>
+          <p:cNvPr id="59" name="Connecteur droit avec flèche 58">
+            <a:extLst>
+              <a:ext uri="{FF2B5EF4-FFF2-40B4-BE49-F238E27FC236}">
+                <a16:creationId xmlns:a16="http://schemas.microsoft.com/office/drawing/2014/main" id="{9C0AB331-2294-4B0E-ABAF-B4BF7EC13EED}"/>
+              </a:ext>
+            </a:extLst>
+          </p:cNvPr>
+          <p:cNvCxnSpPr/>
+          <p:nvPr/>
+        </p:nvCxnSpPr>
+        <p:spPr>
+          <a:xfrm>
+            <a:off x="2979912" y="3765949"/>
+            <a:ext cx="0" cy="568171"/>
+          </a:xfrm>
+          <a:prstGeom prst="straightConnector1">
+            <a:avLst/>
+          </a:prstGeom>
+          <a:ln>
+            <a:tailEnd type="triangle"/>
+          </a:ln>
+        </p:spPr>
+        <p:style>
+          <a:lnRef idx="1">
+            <a:schemeClr val="accent1"/>
+          </a:lnRef>
+          <a:fillRef idx="0">
+            <a:schemeClr val="accent1"/>
+          </a:fillRef>
+          <a:effectRef idx="0">
+            <a:schemeClr val="accent1"/>
+          </a:effectRef>
+          <a:fontRef idx="minor">
+            <a:schemeClr val="tx1"/>
+          </a:fontRef>
+        </p:style>
+      </p:cxnSp>
+      <p:sp>
+        <p:nvSpPr>
+          <p:cNvPr id="77" name="Rectangle 76">
+            <a:extLst>
+              <a:ext uri="{FF2B5EF4-FFF2-40B4-BE49-F238E27FC236}">
+                <a16:creationId xmlns:a16="http://schemas.microsoft.com/office/drawing/2014/main" id="{4B5FEED9-4B09-42B1-B38C-3C6DFEDA3BD4}"/>
+              </a:ext>
+            </a:extLst>
+          </p:cNvPr>
+          <p:cNvSpPr/>
+          <p:nvPr/>
+        </p:nvSpPr>
+        <p:spPr>
+          <a:xfrm>
+            <a:off x="2174230" y="3429000"/>
+            <a:ext cx="1662275" cy="246221"/>
+          </a:xfrm>
+          <a:prstGeom prst="rect">
+            <a:avLst/>
+          </a:prstGeom>
+        </p:spPr>
+        <p:txBody>
+          <a:bodyPr wrap="square">
+            <a:spAutoFit/>
+          </a:bodyPr>
+          <a:lstStyle/>
+          <a:p>
+            <a:pPr algn="ctr"/>
+            <a:r>
+              <a:rPr lang="fr-FR" sz="1000" dirty="0"/>
+              <a:t>Thread d’écoute</a:t>
             </a:r>
           </a:p>
         </p:txBody>

</xml_diff>